<commit_message>
Very very small fixes in poster
</commit_message>
<xml_diff>
--- a/poster.pptx
+++ b/poster.pptx
@@ -126,7 +126,7 @@
 <file path=ppt/charts/chart1.xml><?xml version="1.0" encoding="utf-8"?>
 <c:chartSpace xmlns:c="http://schemas.openxmlformats.org/drawingml/2006/chart" xmlns:a="http://schemas.openxmlformats.org/drawingml/2006/main" xmlns:r="http://schemas.openxmlformats.org/officeDocument/2006/relationships" xmlns:c16r2="http://schemas.microsoft.com/office/drawing/2015/06/chart">
   <c:date1904 val="0"/>
-  <c:lang val="en-US"/>
+  <c:lang val="et-EE"/>
   <c:roundedCorners val="0"/>
   <mc:AlternateContent xmlns:mc="http://schemas.openxmlformats.org/markup-compatibility/2006">
     <mc:Choice xmlns:c14="http://schemas.microsoft.com/office/drawing/2007/8/2/chart" Requires="c14">
@@ -176,6 +176,7 @@
           </a:p>
         </c:rich>
       </c:tx>
+      <c:layout/>
       <c:overlay val="0"/>
       <c:spPr>
         <a:noFill/>
@@ -201,7 +202,7 @@
               <a:cs typeface="+mn-cs"/>
             </a:defRPr>
           </a:pPr>
-          <a:endParaRPr lang="en-US"/>
+          <a:endParaRPr lang="et-EE"/>
         </a:p>
       </c:txPr>
     </c:title>
@@ -263,7 +264,7 @@
                     <a:cs typeface="+mn-cs"/>
                   </a:defRPr>
                 </a:pPr>
-                <a:endParaRPr lang="en-US"/>
+                <a:endParaRPr lang="et-EE"/>
               </a:p>
             </c:txPr>
             <c:showLegendKey val="0"/>
@@ -275,6 +276,7 @@
             <c:showLeaderLines val="0"/>
             <c:extLst>
               <c:ext xmlns:c15="http://schemas.microsoft.com/office/drawing/2012/chart" uri="{CE6537A1-D6FC-4f65-9D91-7224C49458BB}">
+                <c15:layout/>
                 <c15:showLeaderLines val="1"/>
                 <c15:leaderLines>
                   <c:spPr>
@@ -397,7 +399,7 @@
                     <a:cs typeface="+mn-cs"/>
                   </a:defRPr>
                 </a:pPr>
-                <a:endParaRPr lang="en-US"/>
+                <a:endParaRPr lang="et-EE"/>
               </a:p>
             </c:txPr>
             <c:showLegendKey val="0"/>
@@ -409,6 +411,7 @@
             <c:showLeaderLines val="0"/>
             <c:extLst>
               <c:ext xmlns:c15="http://schemas.microsoft.com/office/drawing/2012/chart" uri="{CE6537A1-D6FC-4f65-9D91-7224C49458BB}">
+                <c15:layout/>
                 <c15:showLeaderLines val="1"/>
                 <c15:leaderLines>
                   <c:spPr>
@@ -534,7 +537,7 @@
                 <a:cs typeface="+mn-cs"/>
               </a:defRPr>
             </a:pPr>
-            <a:endParaRPr lang="en-US"/>
+            <a:endParaRPr lang="et-EE"/>
           </a:p>
         </c:txPr>
         <c:crossAx val="454407592"/>
@@ -593,7 +596,7 @@
                 <a:cs typeface="+mn-cs"/>
               </a:defRPr>
             </a:pPr>
-            <a:endParaRPr lang="en-US"/>
+            <a:endParaRPr lang="et-EE"/>
           </a:p>
         </c:txPr>
         <c:crossAx val="454401688"/>
@@ -610,6 +613,7 @@
     </c:plotArea>
     <c:legend>
       <c:legendPos val="b"/>
+      <c:layout/>
       <c:overlay val="0"/>
       <c:spPr>
         <a:noFill/>
@@ -635,7 +639,7 @@
               <a:cs typeface="+mn-cs"/>
             </a:defRPr>
           </a:pPr>
-          <a:endParaRPr lang="en-US"/>
+          <a:endParaRPr lang="et-EE"/>
         </a:p>
       </c:txPr>
     </c:legend>
@@ -648,7 +652,9 @@
       <a:schemeClr val="bg1"/>
     </a:solidFill>
     <a:ln>
-      <a:noFill/>
+      <a:solidFill>
+        <a:schemeClr val="tx1"/>
+      </a:solidFill>
     </a:ln>
     <a:effectLst/>
   </c:spPr>
@@ -659,7 +665,7 @@
       <a:pPr>
         <a:defRPr/>
       </a:pPr>
-      <a:endParaRPr lang="en-US"/>
+      <a:endParaRPr lang="et-EE"/>
     </a:p>
   </c:txPr>
   <c:externalData r:id="rId3">
@@ -671,7 +677,7 @@
 <file path=ppt/charts/chart2.xml><?xml version="1.0" encoding="utf-8"?>
 <c:chartSpace xmlns:c="http://schemas.openxmlformats.org/drawingml/2006/chart" xmlns:a="http://schemas.openxmlformats.org/drawingml/2006/main" xmlns:r="http://schemas.openxmlformats.org/officeDocument/2006/relationships" xmlns:c16r2="http://schemas.microsoft.com/office/drawing/2015/06/chart">
   <c:date1904 val="0"/>
-  <c:lang val="en-US"/>
+  <c:lang val="et-EE"/>
   <c:roundedCorners val="0"/>
   <mc:AlternateContent xmlns:mc="http://schemas.openxmlformats.org/markup-compatibility/2006">
     <mc:Choice xmlns:c14="http://schemas.microsoft.com/office/drawing/2007/8/2/chart" Requires="c14">
@@ -705,6 +711,7 @@
           </a:p>
         </c:rich>
       </c:tx>
+      <c:layout/>
       <c:overlay val="0"/>
       <c:spPr>
         <a:noFill/>
@@ -727,7 +734,7 @@
               <a:cs typeface="+mn-cs"/>
             </a:defRPr>
           </a:pPr>
-          <a:endParaRPr lang="en-US"/>
+          <a:endParaRPr lang="et-EE"/>
         </a:p>
       </c:txPr>
     </c:title>
@@ -2303,7 +2310,7 @@
                 <a:cs typeface="+mn-cs"/>
               </a:defRPr>
             </a:pPr>
-            <a:endParaRPr lang="en-US"/>
+            <a:endParaRPr lang="et-EE"/>
           </a:p>
         </c:txPr>
         <c:crossAx val="655870160"/>
@@ -2357,6 +2364,7 @@
               </a:p>
             </c:rich>
           </c:tx>
+          <c:layout/>
           <c:overlay val="0"/>
           <c:spPr>
             <a:noFill/>
@@ -2379,7 +2387,7 @@
                   <a:cs typeface="+mn-cs"/>
                 </a:defRPr>
               </a:pPr>
-              <a:endParaRPr lang="en-US"/>
+              <a:endParaRPr lang="et-EE"/>
             </a:p>
           </c:txPr>
         </c:title>
@@ -2408,7 +2416,7 @@
                 <a:cs typeface="+mn-cs"/>
               </a:defRPr>
             </a:pPr>
-            <a:endParaRPr lang="en-US"/>
+            <a:endParaRPr lang="et-EE"/>
           </a:p>
         </c:txPr>
         <c:crossAx val="655869504"/>
@@ -2447,6 +2455,7 @@
               </a:p>
             </c:rich>
           </c:tx>
+          <c:layout/>
           <c:overlay val="0"/>
           <c:spPr>
             <a:noFill/>
@@ -2469,7 +2478,7 @@
                   <a:cs typeface="+mn-cs"/>
                 </a:defRPr>
               </a:pPr>
-              <a:endParaRPr lang="en-US"/>
+              <a:endParaRPr lang="et-EE"/>
             </a:p>
           </c:txPr>
         </c:title>
@@ -2498,7 +2507,7 @@
                 <a:cs typeface="+mn-cs"/>
               </a:defRPr>
             </a:pPr>
-            <a:endParaRPr lang="en-US"/>
+            <a:endParaRPr lang="et-EE"/>
           </a:p>
         </c:txPr>
         <c:crossAx val="584572856"/>
@@ -2555,7 +2564,7 @@
                 <a:cs typeface="+mn-cs"/>
               </a:defRPr>
             </a:pPr>
-            <a:endParaRPr lang="en-US"/>
+            <a:endParaRPr lang="et-EE"/>
           </a:p>
         </c:txPr>
       </c:dTable>
@@ -2576,56 +2585,9 @@
       <a:schemeClr val="bg1"/>
     </a:solidFill>
     <a:ln w="9525" cap="flat" cmpd="sng" algn="ctr">
-      <a:gradFill flip="none" rotWithShape="1">
-        <a:gsLst>
-          <a:gs pos="80000">
-            <a:srgbClr val="B7D3ED"/>
-          </a:gs>
-          <a:gs pos="71687">
-            <a:srgbClr val="B8D4ED"/>
-          </a:gs>
-          <a:gs pos="69375">
-            <a:srgbClr val="BAD5EE"/>
-          </a:gs>
-          <a:gs pos="64750">
-            <a:srgbClr val="BED7EF"/>
-          </a:gs>
-          <a:gs pos="55500">
-            <a:srgbClr val="C6DCF1"/>
-          </a:gs>
-          <a:gs pos="37000">
-            <a:srgbClr val="D6E6F5"/>
-          </a:gs>
-          <a:gs pos="0">
-            <a:schemeClr val="accent1">
-              <a:lumMod val="5000"/>
-              <a:lumOff val="95000"/>
-            </a:schemeClr>
-          </a:gs>
-          <a:gs pos="74000">
-            <a:schemeClr val="accent1">
-              <a:lumMod val="45000"/>
-              <a:lumOff val="55000"/>
-            </a:schemeClr>
-          </a:gs>
-          <a:gs pos="83000">
-            <a:schemeClr val="accent1">
-              <a:lumMod val="45000"/>
-              <a:lumOff val="55000"/>
-            </a:schemeClr>
-          </a:gs>
-          <a:gs pos="100000">
-            <a:schemeClr val="accent1">
-              <a:lumMod val="30000"/>
-              <a:lumOff val="70000"/>
-            </a:schemeClr>
-          </a:gs>
-        </a:gsLst>
-        <a:path path="circle">
-          <a:fillToRect l="100000" t="100000"/>
-        </a:path>
-        <a:tileRect r="-100000" b="-100000"/>
-      </a:gradFill>
+      <a:solidFill>
+        <a:schemeClr val="tx1"/>
+      </a:solidFill>
       <a:round/>
     </a:ln>
     <a:effectLst/>
@@ -2641,7 +2603,7 @@
           </a:solidFill>
         </a:defRPr>
       </a:pPr>
-      <a:endParaRPr lang="en-US"/>
+      <a:endParaRPr lang="et-EE"/>
     </a:p>
   </c:txPr>
   <c:externalData r:id="rId3">
@@ -2653,7 +2615,7 @@
 <file path=ppt/charts/chart3.xml><?xml version="1.0" encoding="utf-8"?>
 <c:chartSpace xmlns:c="http://schemas.openxmlformats.org/drawingml/2006/chart" xmlns:a="http://schemas.openxmlformats.org/drawingml/2006/main" xmlns:r="http://schemas.openxmlformats.org/officeDocument/2006/relationships" xmlns:c16r2="http://schemas.microsoft.com/office/drawing/2015/06/chart">
   <c:date1904 val="0"/>
-  <c:lang val="en-US"/>
+  <c:lang val="et-EE"/>
   <c:roundedCorners val="0"/>
   <mc:AlternateContent xmlns:mc="http://schemas.openxmlformats.org/markup-compatibility/2006">
     <mc:Choice xmlns:c14="http://schemas.microsoft.com/office/drawing/2007/8/2/chart" Requires="c14">
@@ -2690,6 +2652,7 @@
           </a:p>
         </c:rich>
       </c:tx>
+      <c:layout/>
       <c:overlay val="0"/>
       <c:spPr>
         <a:noFill/>
@@ -2712,7 +2675,7 @@
               <a:cs typeface="+mn-cs"/>
             </a:defRPr>
           </a:pPr>
-          <a:endParaRPr lang="en-US"/>
+          <a:endParaRPr lang="et-EE"/>
         </a:p>
       </c:txPr>
     </c:title>
@@ -2794,7 +2757,7 @@
                     <a:cs typeface="+mn-cs"/>
                   </a:defRPr>
                 </a:pPr>
-                <a:endParaRPr lang="en-US"/>
+                <a:endParaRPr lang="et-EE"/>
               </a:p>
             </c:txPr>
             <c:dLblPos val="inEnd"/>
@@ -2807,6 +2770,7 @@
             <c:showLeaderLines val="0"/>
             <c:extLst>
               <c:ext xmlns:c15="http://schemas.microsoft.com/office/drawing/2012/chart" uri="{CE6537A1-D6FC-4f65-9D91-7224C49458BB}">
+                <c15:layout/>
                 <c15:showLeaderLines val="1"/>
                 <c15:leaderLines>
                   <c:spPr>
@@ -3038,7 +3002,7 @@
                     <a:cs typeface="+mn-cs"/>
                   </a:defRPr>
                 </a:pPr>
-                <a:endParaRPr lang="en-US"/>
+                <a:endParaRPr lang="et-EE"/>
               </a:p>
             </c:txPr>
             <c:dLblPos val="inEnd"/>
@@ -3051,6 +3015,7 @@
             <c:showLeaderLines val="0"/>
             <c:extLst>
               <c:ext xmlns:c15="http://schemas.microsoft.com/office/drawing/2012/chart" uri="{CE6537A1-D6FC-4f65-9D91-7224C49458BB}">
+                <c15:layout/>
                 <c15:showLeaderLines val="1"/>
                 <c15:leaderLines>
                   <c:spPr>
@@ -3263,7 +3228,7 @@
                 <a:cs typeface="+mn-cs"/>
               </a:defRPr>
             </a:pPr>
-            <a:endParaRPr lang="en-US"/>
+            <a:endParaRPr lang="et-EE"/>
           </a:p>
         </c:txPr>
         <c:crossAx val="454564000"/>
@@ -3319,7 +3284,7 @@
                 <a:cs typeface="+mn-cs"/>
               </a:defRPr>
             </a:pPr>
-            <a:endParaRPr lang="en-US"/>
+            <a:endParaRPr lang="et-EE"/>
           </a:p>
         </c:txPr>
         <c:crossAx val="454559080"/>
@@ -3336,6 +3301,7 @@
     </c:plotArea>
     <c:legend>
       <c:legendPos val="b"/>
+      <c:layout/>
       <c:overlay val="0"/>
       <c:spPr>
         <a:noFill/>
@@ -3358,12 +3324,13 @@
               <a:cs typeface="+mn-cs"/>
             </a:defRPr>
           </a:pPr>
-          <a:endParaRPr lang="en-US"/>
+          <a:endParaRPr lang="et-EE"/>
         </a:p>
       </c:txPr>
     </c:legend>
     <c:plotVisOnly val="1"/>
     <c:dispBlanksAs val="gap"/>
+    <c:showDLblsOverMax val="0"/>
     <c:extLst>
       <c:ext xmlns:c16r3="http://schemas.microsoft.com/office/drawing/2017/03/chart" uri="{56B9EC1D-385E-4148-901F-78D8002777C0}">
         <c16r3:dataDisplayOptions16>
@@ -3371,14 +3338,15 @@
         </c16r3:dataDisplayOptions16>
       </c:ext>
     </c:extLst>
-    <c:showDLblsOverMax val="0"/>
   </c:chart>
   <c:spPr>
     <a:solidFill>
       <a:schemeClr val="bg1"/>
     </a:solidFill>
     <a:ln>
-      <a:noFill/>
+      <a:solidFill>
+        <a:schemeClr val="tx1"/>
+      </a:solidFill>
     </a:ln>
     <a:effectLst/>
   </c:spPr>
@@ -3389,7 +3357,7 @@
       <a:pPr>
         <a:defRPr/>
       </a:pPr>
-      <a:endParaRPr lang="en-US"/>
+      <a:endParaRPr lang="et-EE"/>
     </a:p>
   </c:txPr>
   <c:externalData r:id="rId3">
@@ -5139,7 +5107,7 @@
           <a:p>
             <a:fld id="{FF02F886-A6EC-4A2D-B279-21243BFE44BC}" type="datetimeFigureOut">
               <a:rPr lang="en-US" smtClean="0"/>
-              <a:t>15-Dec-19</a:t>
+              <a:t>12/15/2019</a:t>
             </a:fld>
             <a:endParaRPr lang="en-US"/>
           </a:p>
@@ -5337,7 +5305,7 @@
           <a:p>
             <a:fld id="{FF02F886-A6EC-4A2D-B279-21243BFE44BC}" type="datetimeFigureOut">
               <a:rPr lang="en-US" smtClean="0"/>
-              <a:t>15-Dec-19</a:t>
+              <a:t>12/15/2019</a:t>
             </a:fld>
             <a:endParaRPr lang="en-US"/>
           </a:p>
@@ -5545,7 +5513,7 @@
           <a:p>
             <a:fld id="{FF02F886-A6EC-4A2D-B279-21243BFE44BC}" type="datetimeFigureOut">
               <a:rPr lang="en-US" smtClean="0"/>
-              <a:t>15-Dec-19</a:t>
+              <a:t>12/15/2019</a:t>
             </a:fld>
             <a:endParaRPr lang="en-US"/>
           </a:p>
@@ -5743,7 +5711,7 @@
           <a:p>
             <a:fld id="{FF02F886-A6EC-4A2D-B279-21243BFE44BC}" type="datetimeFigureOut">
               <a:rPr lang="en-US" smtClean="0"/>
-              <a:t>15-Dec-19</a:t>
+              <a:t>12/15/2019</a:t>
             </a:fld>
             <a:endParaRPr lang="en-US"/>
           </a:p>
@@ -6018,7 +5986,7 @@
           <a:p>
             <a:fld id="{FF02F886-A6EC-4A2D-B279-21243BFE44BC}" type="datetimeFigureOut">
               <a:rPr lang="en-US" smtClean="0"/>
-              <a:t>15-Dec-19</a:t>
+              <a:t>12/15/2019</a:t>
             </a:fld>
             <a:endParaRPr lang="en-US"/>
           </a:p>
@@ -6283,7 +6251,7 @@
           <a:p>
             <a:fld id="{FF02F886-A6EC-4A2D-B279-21243BFE44BC}" type="datetimeFigureOut">
               <a:rPr lang="en-US" smtClean="0"/>
-              <a:t>15-Dec-19</a:t>
+              <a:t>12/15/2019</a:t>
             </a:fld>
             <a:endParaRPr lang="en-US"/>
           </a:p>
@@ -6695,7 +6663,7 @@
           <a:p>
             <a:fld id="{FF02F886-A6EC-4A2D-B279-21243BFE44BC}" type="datetimeFigureOut">
               <a:rPr lang="en-US" smtClean="0"/>
-              <a:t>15-Dec-19</a:t>
+              <a:t>12/15/2019</a:t>
             </a:fld>
             <a:endParaRPr lang="en-US"/>
           </a:p>
@@ -6836,7 +6804,7 @@
           <a:p>
             <a:fld id="{FF02F886-A6EC-4A2D-B279-21243BFE44BC}" type="datetimeFigureOut">
               <a:rPr lang="en-US" smtClean="0"/>
-              <a:t>15-Dec-19</a:t>
+              <a:t>12/15/2019</a:t>
             </a:fld>
             <a:endParaRPr lang="en-US"/>
           </a:p>
@@ -6949,7 +6917,7 @@
           <a:p>
             <a:fld id="{FF02F886-A6EC-4A2D-B279-21243BFE44BC}" type="datetimeFigureOut">
               <a:rPr lang="en-US" smtClean="0"/>
-              <a:t>15-Dec-19</a:t>
+              <a:t>12/15/2019</a:t>
             </a:fld>
             <a:endParaRPr lang="en-US"/>
           </a:p>
@@ -7260,7 +7228,7 @@
           <a:p>
             <a:fld id="{FF02F886-A6EC-4A2D-B279-21243BFE44BC}" type="datetimeFigureOut">
               <a:rPr lang="en-US" smtClean="0"/>
-              <a:t>15-Dec-19</a:t>
+              <a:t>12/15/2019</a:t>
             </a:fld>
             <a:endParaRPr lang="en-US"/>
           </a:p>
@@ -7548,7 +7516,7 @@
           <a:p>
             <a:fld id="{FF02F886-A6EC-4A2D-B279-21243BFE44BC}" type="datetimeFigureOut">
               <a:rPr lang="en-US" smtClean="0"/>
-              <a:t>15-Dec-19</a:t>
+              <a:t>12/15/2019</a:t>
             </a:fld>
             <a:endParaRPr lang="en-US"/>
           </a:p>
@@ -7789,7 +7757,7 @@
           <a:p>
             <a:fld id="{FF02F886-A6EC-4A2D-B279-21243BFE44BC}" type="datetimeFigureOut">
               <a:rPr lang="en-US" smtClean="0"/>
-              <a:t>15-Dec-19</a:t>
+              <a:t>12/15/2019</a:t>
             </a:fld>
             <a:endParaRPr lang="en-US"/>
           </a:p>
@@ -8651,12 +8619,12 @@
         </p:nvCxnSpPr>
         <p:spPr>
           <a:xfrm rot="16200000" flipH="1">
-            <a:off x="22162667" y="17278350"/>
-            <a:ext cx="1265698" cy="29495"/>
+            <a:off x="22213844" y="17324987"/>
+            <a:ext cx="1138656" cy="4808"/>
           </a:xfrm>
           <a:prstGeom prst="curvedConnector3">
             <a:avLst>
-              <a:gd name="adj1" fmla="val 38348"/>
+              <a:gd name="adj1" fmla="val 50000"/>
             </a:avLst>
           </a:prstGeom>
           <a:ln w="82550">
@@ -8756,7 +8724,7 @@
           <p:nvPr>
             <p:extLst>
               <p:ext uri="{D42A27DB-BD31-4B8C-83A1-F6EECF244321}">
-                <p14:modId xmlns:p14="http://schemas.microsoft.com/office/powerpoint/2010/main" val="883573826"/>
+                <p14:modId xmlns:p14="http://schemas.microsoft.com/office/powerpoint/2010/main" val="3581233268"/>
               </p:ext>
             </p:extLst>
           </p:nvPr>
@@ -8786,7 +8754,7 @@
           <p:nvPr>
             <p:extLst>
               <p:ext uri="{D42A27DB-BD31-4B8C-83A1-F6EECF244321}">
-                <p14:modId xmlns:p14="http://schemas.microsoft.com/office/powerpoint/2010/main" val="204084706"/>
+                <p14:modId xmlns:p14="http://schemas.microsoft.com/office/powerpoint/2010/main" val="2733969623"/>
               </p:ext>
             </p:extLst>
           </p:nvPr>
@@ -8816,7 +8784,7 @@
           <p:nvPr>
             <p:extLst>
               <p:ext uri="{D42A27DB-BD31-4B8C-83A1-F6EECF244321}">
-                <p14:modId xmlns:p14="http://schemas.microsoft.com/office/powerpoint/2010/main" val="3193208946"/>
+                <p14:modId xmlns:p14="http://schemas.microsoft.com/office/powerpoint/2010/main" val="2897479629"/>
               </p:ext>
             </p:extLst>
           </p:nvPr>
@@ -8915,6 +8883,11 @@
           <a:solidFill>
             <a:schemeClr val="bg1"/>
           </a:solidFill>
+          <a:ln>
+            <a:solidFill>
+              <a:schemeClr val="tx1"/>
+            </a:solidFill>
+          </a:ln>
         </p:spPr>
         <p:txBody>
           <a:bodyPr wrap="square" rtlCol="0">
@@ -9030,8 +9003,26 @@
                 <a:latin typeface="Berlin Sans FB" panose="020E0602020502020306" pitchFamily="34" charset="0"/>
                 <a:cs typeface="Times New Roman" panose="02020603050405020304" pitchFamily="18" charset="0"/>
               </a:rPr>
-              <a:t>(difference in 0.1 decimal). Unfortunately, the data files did not have any information about the players, so only teams and coefficients were taken into account for prediction</a:t>
-            </a:r>
+              <a:t>(difference in 0.1 decimal). Unfortunately, the data files did not have any information about the players, so only teams and coefficients were taken into account for </a:t>
+            </a:r>
+            <a:r>
+              <a:rPr lang="en-US" sz="3200" dirty="0" smtClean="0">
+                <a:latin typeface="Berlin Sans FB" panose="020E0602020502020306" pitchFamily="34" charset="0"/>
+                <a:cs typeface="Times New Roman" panose="02020603050405020304" pitchFamily="18" charset="0"/>
+              </a:rPr>
+              <a:t>prediction</a:t>
+            </a:r>
+            <a:r>
+              <a:rPr lang="et-EE" sz="3200" dirty="0" smtClean="0">
+                <a:latin typeface="Berlin Sans FB" panose="020E0602020502020306" pitchFamily="34" charset="0"/>
+                <a:cs typeface="Times New Roman" panose="02020603050405020304" pitchFamily="18" charset="0"/>
+              </a:rPr>
+              <a:t>.</a:t>
+            </a:r>
+            <a:endParaRPr lang="en-US" sz="3200" dirty="0">
+              <a:latin typeface="Berlin Sans FB" panose="020E0602020502020306" pitchFamily="34" charset="0"/>
+              <a:cs typeface="Times New Roman" panose="02020603050405020304" pitchFamily="18" charset="0"/>
+            </a:endParaRPr>
           </a:p>
         </p:txBody>
       </p:sp>
@@ -9052,6 +9043,11 @@
           <a:solidFill>
             <a:schemeClr val="bg1"/>
           </a:solidFill>
+          <a:ln>
+            <a:solidFill>
+              <a:schemeClr val="tx1"/>
+            </a:solidFill>
+          </a:ln>
         </p:spPr>
         <p:txBody>
           <a:bodyPr wrap="square" rtlCol="0">
@@ -9194,6 +9190,11 @@
           <a:solidFill>
             <a:schemeClr val="bg1"/>
           </a:solidFill>
+          <a:ln>
+            <a:solidFill>
+              <a:schemeClr val="tx1"/>
+            </a:solidFill>
+          </a:ln>
         </p:spPr>
         <p:txBody>
           <a:bodyPr wrap="square" rtlCol="0">
@@ -9218,7 +9219,25 @@
               <a:rPr lang="en-US" sz="3200" dirty="0">
                 <a:latin typeface="Berlin Sans FB" panose="020E0602020502020306" pitchFamily="34" charset="0"/>
               </a:rPr>
-              <a:t>In the end, we can say that making money through football betting is very risky. You can never be sure that a weak team with a coefficient of 11.0 can lose to a team with a coefficient of 1.10</a:t>
+              <a:t>In the end, we can say that making money through football betting is very risky. You can never be sure that a weak team with a coefficient of 11.0 </a:t>
+            </a:r>
+            <a:r>
+              <a:rPr lang="et-EE" sz="3200" dirty="0" err="1" smtClean="0">
+                <a:latin typeface="Berlin Sans FB" panose="020E0602020502020306" pitchFamily="34" charset="0"/>
+              </a:rPr>
+              <a:t>will</a:t>
+            </a:r>
+            <a:r>
+              <a:rPr lang="en-US" sz="3200" dirty="0" smtClean="0">
+                <a:latin typeface="Berlin Sans FB" panose="020E0602020502020306" pitchFamily="34" charset="0"/>
+              </a:rPr>
+              <a:t> </a:t>
+            </a:r>
+            <a:r>
+              <a:rPr lang="en-US" sz="3200" dirty="0">
+                <a:latin typeface="Berlin Sans FB" panose="020E0602020502020306" pitchFamily="34" charset="0"/>
+              </a:rPr>
+              <a:t>lose to a team with a coefficient of 1.10</a:t>
             </a:r>
             <a:r>
               <a:rPr lang="ru-RU" sz="3200" dirty="0">
@@ -9420,15 +9439,7 @@
               <a:srgbClr val="C0C0C0"/>
             </a:contourClr>
           </a:sp3d>
-          <a:extLst>
-            <a:ext uri="{909E8E84-426E-40DD-AFC4-6F175D3DCCD1}">
-              <a14:hiddenFill xmlns:a14="http://schemas.microsoft.com/office/drawing/2010/main">
-                <a:solidFill>
-                  <a:srgbClr val="FFFFFF"/>
-                </a:solidFill>
-              </a14:hiddenFill>
-            </a:ext>
-          </a:extLst>
+          <a:extLst/>
         </p:spPr>
       </p:pic>
       <p:pic>
@@ -9495,15 +9506,7 @@
               <a:srgbClr val="C0C0C0"/>
             </a:contourClr>
           </a:sp3d>
-          <a:extLst>
-            <a:ext uri="{909E8E84-426E-40DD-AFC4-6F175D3DCCD1}">
-              <a14:hiddenFill xmlns:a14="http://schemas.microsoft.com/office/drawing/2010/main">
-                <a:solidFill>
-                  <a:srgbClr val="FFFFFF"/>
-                </a:solidFill>
-              </a14:hiddenFill>
-            </a:ext>
-          </a:extLst>
+          <a:extLst/>
         </p:spPr>
       </p:pic>
       <p:pic>

</xml_diff>